<commit_message>
Gave schematic bigger text adn clearer colours
</commit_message>
<xml_diff>
--- a/figures/model_schematic.pptx
+++ b/figures/model_schematic.pptx
@@ -254,7 +254,7 @@
           <a:p>
             <a:fld id="{38358F19-04FC-804D-A08D-923B11D07663}" type="datetimeFigureOut">
               <a:rPr lang="en-GB" smtClean="0"/>
-              <a:t>16/06/2021</a:t>
+              <a:t>26/09/2021</a:t>
             </a:fld>
             <a:endParaRPr lang="en-GB"/>
           </a:p>
@@ -424,7 +424,7 @@
           <a:p>
             <a:fld id="{38358F19-04FC-804D-A08D-923B11D07663}" type="datetimeFigureOut">
               <a:rPr lang="en-GB" smtClean="0"/>
-              <a:t>16/06/2021</a:t>
+              <a:t>26/09/2021</a:t>
             </a:fld>
             <a:endParaRPr lang="en-GB"/>
           </a:p>
@@ -604,7 +604,7 @@
           <a:p>
             <a:fld id="{38358F19-04FC-804D-A08D-923B11D07663}" type="datetimeFigureOut">
               <a:rPr lang="en-GB" smtClean="0"/>
-              <a:t>16/06/2021</a:t>
+              <a:t>26/09/2021</a:t>
             </a:fld>
             <a:endParaRPr lang="en-GB"/>
           </a:p>
@@ -774,7 +774,7 @@
           <a:p>
             <a:fld id="{38358F19-04FC-804D-A08D-923B11D07663}" type="datetimeFigureOut">
               <a:rPr lang="en-GB" smtClean="0"/>
-              <a:t>16/06/2021</a:t>
+              <a:t>26/09/2021</a:t>
             </a:fld>
             <a:endParaRPr lang="en-GB"/>
           </a:p>
@@ -1020,7 +1020,7 @@
           <a:p>
             <a:fld id="{38358F19-04FC-804D-A08D-923B11D07663}" type="datetimeFigureOut">
               <a:rPr lang="en-GB" smtClean="0"/>
-              <a:t>16/06/2021</a:t>
+              <a:t>26/09/2021</a:t>
             </a:fld>
             <a:endParaRPr lang="en-GB"/>
           </a:p>
@@ -1252,7 +1252,7 @@
           <a:p>
             <a:fld id="{38358F19-04FC-804D-A08D-923B11D07663}" type="datetimeFigureOut">
               <a:rPr lang="en-GB" smtClean="0"/>
-              <a:t>16/06/2021</a:t>
+              <a:t>26/09/2021</a:t>
             </a:fld>
             <a:endParaRPr lang="en-GB"/>
           </a:p>
@@ -1619,7 +1619,7 @@
           <a:p>
             <a:fld id="{38358F19-04FC-804D-A08D-923B11D07663}" type="datetimeFigureOut">
               <a:rPr lang="en-GB" smtClean="0"/>
-              <a:t>16/06/2021</a:t>
+              <a:t>26/09/2021</a:t>
             </a:fld>
             <a:endParaRPr lang="en-GB"/>
           </a:p>
@@ -1737,7 +1737,7 @@
           <a:p>
             <a:fld id="{38358F19-04FC-804D-A08D-923B11D07663}" type="datetimeFigureOut">
               <a:rPr lang="en-GB" smtClean="0"/>
-              <a:t>16/06/2021</a:t>
+              <a:t>26/09/2021</a:t>
             </a:fld>
             <a:endParaRPr lang="en-GB"/>
           </a:p>
@@ -1832,7 +1832,7 @@
           <a:p>
             <a:fld id="{38358F19-04FC-804D-A08D-923B11D07663}" type="datetimeFigureOut">
               <a:rPr lang="en-GB" smtClean="0"/>
-              <a:t>16/06/2021</a:t>
+              <a:t>26/09/2021</a:t>
             </a:fld>
             <a:endParaRPr lang="en-GB"/>
           </a:p>
@@ -2109,7 +2109,7 @@
           <a:p>
             <a:fld id="{38358F19-04FC-804D-A08D-923B11D07663}" type="datetimeFigureOut">
               <a:rPr lang="en-GB" smtClean="0"/>
-              <a:t>16/06/2021</a:t>
+              <a:t>26/09/2021</a:t>
             </a:fld>
             <a:endParaRPr lang="en-GB"/>
           </a:p>
@@ -2366,7 +2366,7 @@
           <a:p>
             <a:fld id="{38358F19-04FC-804D-A08D-923B11D07663}" type="datetimeFigureOut">
               <a:rPr lang="en-GB" smtClean="0"/>
-              <a:t>16/06/2021</a:t>
+              <a:t>26/09/2021</a:t>
             </a:fld>
             <a:endParaRPr lang="en-GB"/>
           </a:p>
@@ -2579,7 +2579,7 @@
           <a:p>
             <a:fld id="{38358F19-04FC-804D-A08D-923B11D07663}" type="datetimeFigureOut">
               <a:rPr lang="en-GB" smtClean="0"/>
-              <a:t>16/06/2021</a:t>
+              <a:t>26/09/2021</a:t>
             </a:fld>
             <a:endParaRPr lang="en-GB"/>
           </a:p>
@@ -3035,7 +3035,7 @@
         </p:blipFill>
         <p:spPr>
           <a:xfrm>
-            <a:off x="301740" y="433646"/>
+            <a:off x="306308" y="386365"/>
             <a:ext cx="723198" cy="723198"/>
           </a:xfrm>
           <a:prstGeom prst="rect">
@@ -3057,8 +3057,8 @@
         </p:nvSpPr>
         <p:spPr>
           <a:xfrm>
-            <a:off x="198144" y="218202"/>
-            <a:ext cx="962123" cy="215444"/>
+            <a:off x="101964" y="218202"/>
+            <a:ext cx="1154483" cy="246221"/>
           </a:xfrm>
           <a:prstGeom prst="rect">
             <a:avLst/>
@@ -3073,7 +3073,7 @@
           <a:p>
             <a:pPr algn="ctr"/>
             <a:r>
-              <a:rPr lang="en-GB" sz="800" dirty="0"/>
+              <a:rPr lang="en-GB" sz="1000" dirty="0"/>
               <a:t>One-hot Sequence</a:t>
             </a:r>
           </a:p>
@@ -3093,8 +3093,8 @@
         </p:nvSpPr>
         <p:spPr>
           <a:xfrm>
-            <a:off x="235939" y="1039198"/>
-            <a:ext cx="788999" cy="338554"/>
+            <a:off x="149648" y="972127"/>
+            <a:ext cx="939681" cy="400110"/>
           </a:xfrm>
           <a:prstGeom prst="rect">
             <a:avLst/>
@@ -3109,14 +3109,14 @@
           <a:p>
             <a:pPr algn="ctr"/>
             <a:r>
-              <a:rPr lang="en-GB" sz="800" dirty="0"/>
+              <a:rPr lang="en-GB" sz="1000" dirty="0"/>
               <a:t>Contact Graph</a:t>
             </a:r>
           </a:p>
           <a:p>
             <a:pPr algn="ctr"/>
             <a:r>
-              <a:rPr lang="en-GB" sz="800" dirty="0"/>
+              <a:rPr lang="en-GB" sz="1000" dirty="0"/>
               <a:t>(Optional)</a:t>
             </a:r>
           </a:p>
@@ -3136,8 +3136,8 @@
         </p:nvSpPr>
         <p:spPr>
           <a:xfrm>
-            <a:off x="1073492" y="1064460"/>
-            <a:ext cx="628698" cy="215444"/>
+            <a:off x="1033715" y="1057569"/>
+            <a:ext cx="740908" cy="246221"/>
           </a:xfrm>
           <a:prstGeom prst="rect">
             <a:avLst/>
@@ -3151,10 +3151,10 @@
           <a:lstStyle/>
           <a:p>
             <a:r>
-              <a:rPr lang="en-GB" sz="800" dirty="0" err="1"/>
+              <a:rPr lang="en-GB" sz="1000" dirty="0" err="1"/>
               <a:t>GraphCNN</a:t>
             </a:r>
-            <a:endParaRPr lang="en-GB" sz="800" dirty="0"/>
+            <a:endParaRPr lang="en-GB" sz="1000" dirty="0"/>
           </a:p>
         </p:txBody>
       </p:sp>
@@ -3228,7 +3228,7 @@
         <p:spPr>
           <a:xfrm>
             <a:off x="1955373" y="1270030"/>
-            <a:ext cx="407484" cy="215444"/>
+            <a:ext cx="461986" cy="246221"/>
           </a:xfrm>
           <a:prstGeom prst="rect">
             <a:avLst/>
@@ -3242,7 +3242,7 @@
           <a:lstStyle/>
           <a:p>
             <a:r>
-              <a:rPr lang="en-GB" sz="800" dirty="0"/>
+              <a:rPr lang="en-GB" sz="1000" dirty="0"/>
               <a:t>Input</a:t>
             </a:r>
           </a:p>
@@ -3263,15 +3263,13 @@
         <p:spPr>
           <a:xfrm>
             <a:off x="621291" y="1792034"/>
-            <a:ext cx="79478" cy="90450"/>
+            <a:ext cx="100800" cy="126000"/>
           </a:xfrm>
           <a:prstGeom prst="rightArrow">
             <a:avLst/>
           </a:prstGeom>
           <a:solidFill>
-            <a:schemeClr val="accent3">
-              <a:lumMod val="75000"/>
-            </a:schemeClr>
+            <a:srgbClr val="00B0F0"/>
           </a:solidFill>
           <a:ln>
             <a:noFill/>
@@ -3318,12 +3316,12 @@
         </p:nvCxnSpPr>
         <p:spPr>
           <a:xfrm>
-            <a:off x="1160267" y="325924"/>
-            <a:ext cx="881512" cy="412612"/>
+            <a:off x="1256447" y="341313"/>
+            <a:ext cx="785332" cy="397223"/>
           </a:xfrm>
           <a:prstGeom prst="bentConnector3">
             <a:avLst>
-              <a:gd name="adj1" fmla="val 72673"/>
+              <a:gd name="adj1" fmla="val 69154"/>
             </a:avLst>
           </a:prstGeom>
           <a:ln w="12700">
@@ -3401,17 +3399,18 @@
           </p:cNvPr>
           <p:cNvCxnSpPr>
             <a:cxnSpLocks/>
-            <a:stCxn id="10" idx="3"/>
           </p:cNvCxnSpPr>
           <p:nvPr/>
         </p:nvCxnSpPr>
         <p:spPr>
-          <a:xfrm flipV="1">
-            <a:off x="1702190" y="738536"/>
-            <a:ext cx="95221" cy="433646"/>
-          </a:xfrm>
-          <a:prstGeom prst="bentConnector2">
-            <a:avLst/>
+          <a:xfrm rot="5400000" flipH="1" flipV="1">
+            <a:off x="1525574" y="915092"/>
+            <a:ext cx="448996" cy="95884"/>
+          </a:xfrm>
+          <a:prstGeom prst="bentConnector3">
+            <a:avLst>
+              <a:gd name="adj1" fmla="val -1134"/>
+            </a:avLst>
           </a:prstGeom>
           <a:ln w="12700">
             <a:solidFill>
@@ -3448,16 +3447,14 @@
         </p:nvSpPr>
         <p:spPr>
           <a:xfrm>
-            <a:off x="2253297" y="693311"/>
-            <a:ext cx="79478" cy="90450"/>
+            <a:off x="2241698" y="679407"/>
+            <a:ext cx="100800" cy="126000"/>
           </a:xfrm>
           <a:prstGeom prst="rightArrow">
             <a:avLst/>
           </a:prstGeom>
           <a:solidFill>
-            <a:schemeClr val="accent3">
-              <a:lumMod val="75000"/>
-            </a:schemeClr>
+            <a:srgbClr val="00B0F0"/>
           </a:solidFill>
           <a:ln>
             <a:noFill/>
@@ -3503,7 +3500,7 @@
         <p:spPr>
           <a:xfrm>
             <a:off x="716787" y="1729944"/>
-            <a:ext cx="830677" cy="215444"/>
+            <a:ext cx="989373" cy="246221"/>
           </a:xfrm>
           <a:prstGeom prst="rect">
             <a:avLst/>
@@ -3517,7 +3514,7 @@
           <a:lstStyle/>
           <a:p>
             <a:r>
-              <a:rPr lang="en-GB" sz="800" dirty="0"/>
+              <a:rPr lang="en-GB" sz="1000" dirty="0"/>
               <a:t>1D Convolution</a:t>
             </a:r>
           </a:p>
@@ -3538,15 +3535,13 @@
         <p:spPr>
           <a:xfrm>
             <a:off x="621291" y="2013349"/>
-            <a:ext cx="79478" cy="90450"/>
+            <a:ext cx="100800" cy="126000"/>
           </a:xfrm>
           <a:prstGeom prst="rightArrow">
             <a:avLst/>
           </a:prstGeom>
           <a:solidFill>
-            <a:schemeClr val="accent2">
-              <a:lumMod val="75000"/>
-            </a:schemeClr>
+            <a:srgbClr val="FF0000"/>
           </a:solidFill>
           <a:ln>
             <a:noFill/>
@@ -3592,7 +3587,7 @@
         <p:spPr>
           <a:xfrm>
             <a:off x="708773" y="1950852"/>
-            <a:ext cx="821059" cy="215444"/>
+            <a:ext cx="976549" cy="246221"/>
           </a:xfrm>
           <a:prstGeom prst="rect">
             <a:avLst/>
@@ -3606,7 +3601,7 @@
           <a:lstStyle/>
           <a:p>
             <a:r>
-              <a:rPr lang="en-GB" sz="800" dirty="0"/>
+              <a:rPr lang="en-GB" sz="1000" dirty="0"/>
               <a:t>2x Max Pooling</a:t>
             </a:r>
           </a:p>
@@ -3627,15 +3622,13 @@
         <p:spPr>
           <a:xfrm>
             <a:off x="621291" y="2228793"/>
-            <a:ext cx="79478" cy="90450"/>
+            <a:ext cx="100800" cy="126000"/>
           </a:xfrm>
           <a:prstGeom prst="rightArrow">
             <a:avLst/>
           </a:prstGeom>
           <a:solidFill>
-            <a:schemeClr val="accent4">
-              <a:lumMod val="75000"/>
-            </a:schemeClr>
+            <a:srgbClr val="00B050"/>
           </a:solidFill>
           <a:ln>
             <a:noFill/>
@@ -3681,7 +3674,7 @@
         <p:spPr>
           <a:xfrm>
             <a:off x="708773" y="2166296"/>
-            <a:ext cx="710451" cy="215444"/>
+            <a:ext cx="838691" cy="246221"/>
           </a:xfrm>
           <a:prstGeom prst="rect">
             <a:avLst/>
@@ -3695,7 +3688,7 @@
           <a:lstStyle/>
           <a:p>
             <a:r>
-              <a:rPr lang="en-GB" sz="800" dirty="0"/>
+              <a:rPr lang="en-GB" sz="1000" dirty="0"/>
               <a:t>Up Sampling</a:t>
             </a:r>
           </a:p>
@@ -3770,16 +3763,14 @@
         </p:nvSpPr>
         <p:spPr>
           <a:xfrm>
-            <a:off x="2460886" y="696080"/>
-            <a:ext cx="79478" cy="90450"/>
+            <a:off x="2444809" y="678305"/>
+            <a:ext cx="100800" cy="126000"/>
           </a:xfrm>
           <a:prstGeom prst="rightArrow">
             <a:avLst/>
           </a:prstGeom>
           <a:solidFill>
-            <a:schemeClr val="accent3">
-              <a:lumMod val="75000"/>
-            </a:schemeClr>
+            <a:srgbClr val="00B0F0"/>
           </a:solidFill>
           <a:ln>
             <a:noFill/>
@@ -3831,10 +3822,7 @@
             <a:avLst/>
           </a:prstGeom>
           <a:solidFill>
-            <a:schemeClr val="accent3">
-              <a:lumMod val="40000"/>
-              <a:lumOff val="60000"/>
-            </a:schemeClr>
+            <a:srgbClr val="C4E1F3"/>
           </a:solidFill>
           <a:ln>
             <a:noFill/>
@@ -3880,7 +3868,7 @@
         <p:spPr>
           <a:xfrm>
             <a:off x="621291" y="2444237"/>
-            <a:ext cx="79478" cy="90450"/>
+            <a:ext cx="100800" cy="126000"/>
           </a:xfrm>
           <a:prstGeom prst="rightArrow">
             <a:avLst/>
@@ -3935,7 +3923,7 @@
         <p:spPr>
           <a:xfrm>
             <a:off x="708773" y="2381740"/>
-            <a:ext cx="715260" cy="215444"/>
+            <a:ext cx="846707" cy="246221"/>
           </a:xfrm>
           <a:prstGeom prst="rect">
             <a:avLst/>
@@ -3949,7 +3937,7 @@
           <a:lstStyle/>
           <a:p>
             <a:r>
-              <a:rPr lang="en-GB" sz="800" dirty="0"/>
+              <a:rPr lang="en-GB" sz="1000" dirty="0"/>
               <a:t>Concatenate</a:t>
             </a:r>
           </a:p>
@@ -3969,16 +3957,14 @@
         </p:nvSpPr>
         <p:spPr>
           <a:xfrm rot="5400000">
-            <a:off x="2561447" y="1332656"/>
-            <a:ext cx="79478" cy="90450"/>
+            <a:off x="2550786" y="1314752"/>
+            <a:ext cx="100800" cy="126000"/>
           </a:xfrm>
           <a:prstGeom prst="rightArrow">
             <a:avLst/>
           </a:prstGeom>
           <a:solidFill>
-            <a:schemeClr val="accent2">
-              <a:lumMod val="75000"/>
-            </a:schemeClr>
+            <a:srgbClr val="FF0000"/>
           </a:solidFill>
           <a:ln>
             <a:noFill/>
@@ -4023,7 +4009,7 @@
         </p:nvSpPr>
         <p:spPr>
           <a:xfrm>
-            <a:off x="2560808" y="1451972"/>
+            <a:off x="2545609" y="1451573"/>
             <a:ext cx="122608" cy="493416"/>
           </a:xfrm>
           <a:prstGeom prst="rect">
@@ -4080,8 +4066,8 @@
             </p:nvSpPr>
             <p:spPr>
               <a:xfrm>
-                <a:off x="2068283" y="1565802"/>
-                <a:ext cx="532903" cy="321948"/>
+                <a:off x="1965558" y="1555745"/>
+                <a:ext cx="622735" cy="379463"/>
               </a:xfrm>
               <a:prstGeom prst="rect">
                 <a:avLst/>
@@ -4094,6 +4080,7 @@
               </a:bodyPr>
               <a:lstStyle/>
               <a:p>
+                <a:pPr/>
                 <a14:m>
                   <m:oMathPara xmlns:m="http://schemas.openxmlformats.org/officeDocument/2006/math">
                     <m:oMathParaPr>
@@ -4103,14 +4090,14 @@
                       <m:f>
                         <m:fPr>
                           <m:ctrlPr>
-                            <a:rPr lang="en-GB" sz="800" i="1" smtClean="0">
+                            <a:rPr lang="en-GB" sz="1000" i="1" smtClean="0">
                               <a:latin typeface="Cambria Math" panose="02040503050406030204" pitchFamily="18" charset="0"/>
                             </a:rPr>
                           </m:ctrlPr>
                         </m:fPr>
                         <m:num>
                           <m:r>
-                            <a:rPr lang="en-GB" sz="800" b="0" i="1" smtClean="0">
+                            <a:rPr lang="en-GB" sz="1000" b="0" i="1" smtClean="0">
                               <a:latin typeface="Cambria Math" panose="02040503050406030204" pitchFamily="18" charset="0"/>
                             </a:rPr>
                             <m:t>𝑁</m:t>
@@ -4118,7 +4105,7 @@
                         </m:num>
                         <m:den>
                           <m:r>
-                            <a:rPr lang="en-GB" sz="800" b="0" i="1" smtClean="0">
+                            <a:rPr lang="en-GB" sz="1000" b="0" i="1" smtClean="0">
                               <a:latin typeface="Cambria Math" panose="02040503050406030204" pitchFamily="18" charset="0"/>
                             </a:rPr>
                             <m:t>2</m:t>
@@ -4126,7 +4113,7 @@
                         </m:den>
                       </m:f>
                       <m:r>
-                        <a:rPr lang="en-GB" sz="800" b="0" i="1" smtClean="0">
+                        <a:rPr lang="en-GB" sz="1000" b="0" i="1" smtClean="0">
                           <a:latin typeface="Cambria Math" panose="02040503050406030204" pitchFamily="18" charset="0"/>
                         </a:rPr>
                         <m:t> × 48</m:t>
@@ -4134,7 +4121,7 @@
                     </m:oMath>
                   </m:oMathPara>
                 </a14:m>
-                <a:endParaRPr lang="en-GB" sz="800" dirty="0"/>
+                <a:endParaRPr lang="en-GB" sz="1000" dirty="0"/>
               </a:p>
             </p:txBody>
           </p:sp>
@@ -4156,8 +4143,8 @@
             </p:nvSpPr>
             <p:spPr>
               <a:xfrm>
-                <a:off x="2068283" y="1565802"/>
-                <a:ext cx="532903" cy="321948"/>
+                <a:off x="1965558" y="1555745"/>
+                <a:ext cx="622735" cy="379463"/>
               </a:xfrm>
               <a:prstGeom prst="rect">
                 <a:avLst/>
@@ -4200,8 +4187,8 @@
             </p:nvSpPr>
             <p:spPr>
               <a:xfrm>
-                <a:off x="1924915" y="0"/>
-                <a:ext cx="508473" cy="215444"/>
+                <a:off x="1864756" y="-14109"/>
+                <a:ext cx="590226" cy="246221"/>
               </a:xfrm>
               <a:prstGeom prst="rect">
                 <a:avLst/>
@@ -4214,6 +4201,7 @@
               </a:bodyPr>
               <a:lstStyle/>
               <a:p>
+                <a:pPr/>
                 <a14:m>
                   <m:oMathPara xmlns:m="http://schemas.openxmlformats.org/officeDocument/2006/math">
                     <m:oMathParaPr>
@@ -4224,19 +4212,19 @@
                         <m:rPr>
                           <m:sty m:val="p"/>
                         </m:rPr>
-                        <a:rPr lang="en-GB" sz="800" b="0" i="0" smtClean="0">
+                        <a:rPr lang="en-GB" sz="1000" b="0" i="0" smtClean="0">
                           <a:latin typeface="Cambria Math" panose="02040503050406030204" pitchFamily="18" charset="0"/>
                         </a:rPr>
                         <m:t>N</m:t>
                       </m:r>
                       <m:r>
-                        <a:rPr lang="en-GB" sz="800" b="0" i="0" smtClean="0">
+                        <a:rPr lang="en-GB" sz="1000" b="0" i="0" smtClean="0">
                           <a:latin typeface="Cambria Math" panose="02040503050406030204" pitchFamily="18" charset="0"/>
                         </a:rPr>
                         <m:t> </m:t>
                       </m:r>
                       <m:r>
-                        <a:rPr lang="en-GB" sz="800" b="0" i="1" smtClean="0">
+                        <a:rPr lang="en-GB" sz="1000" b="0" i="1" smtClean="0">
                           <a:latin typeface="Cambria Math" panose="02040503050406030204" pitchFamily="18" charset="0"/>
                         </a:rPr>
                         <m:t>× 20</m:t>
@@ -4244,7 +4232,7 @@
                     </m:oMath>
                   </m:oMathPara>
                 </a14:m>
-                <a:endParaRPr lang="en-GB" sz="800" dirty="0"/>
+                <a:endParaRPr lang="en-GB" sz="1000" dirty="0"/>
               </a:p>
             </p:txBody>
           </p:sp>
@@ -4266,8 +4254,8 @@
             </p:nvSpPr>
             <p:spPr>
               <a:xfrm>
-                <a:off x="1924915" y="0"/>
-                <a:ext cx="508473" cy="215444"/>
+                <a:off x="1864756" y="-14109"/>
+                <a:ext cx="590226" cy="246221"/>
               </a:xfrm>
               <a:prstGeom prst="rect">
                 <a:avLst/>
@@ -4275,7 +4263,7 @@
               <a:blipFill>
                 <a:blip r:embed="rId5"/>
                 <a:stretch>
-                  <a:fillRect b="-5882"/>
+                  <a:fillRect/>
                 </a:stretch>
               </a:blipFill>
             </p:spPr>
@@ -4308,8 +4296,8 @@
         </p:nvSpPr>
         <p:spPr>
           <a:xfrm>
-            <a:off x="2622623" y="2013349"/>
-            <a:ext cx="960519" cy="215444"/>
+            <a:off x="2536677" y="2005377"/>
+            <a:ext cx="1151277" cy="246221"/>
           </a:xfrm>
           <a:prstGeom prst="rect">
             <a:avLst/>
@@ -4323,7 +4311,7 @@
           <a:lstStyle/>
           <a:p>
             <a:r>
-              <a:rPr lang="en-GB" sz="800" dirty="0"/>
+              <a:rPr lang="en-GB" sz="1000" dirty="0"/>
               <a:t>Repeat for L layers</a:t>
             </a:r>
           </a:p>
@@ -4343,16 +4331,14 @@
         </p:nvSpPr>
         <p:spPr>
           <a:xfrm>
-            <a:off x="2708345" y="1650160"/>
-            <a:ext cx="79478" cy="90450"/>
+            <a:off x="2683138" y="1653273"/>
+            <a:ext cx="100800" cy="126000"/>
           </a:xfrm>
           <a:prstGeom prst="rightArrow">
             <a:avLst/>
           </a:prstGeom>
           <a:solidFill>
-            <a:schemeClr val="accent3">
-              <a:lumMod val="75000"/>
-            </a:schemeClr>
+            <a:srgbClr val="00B0F0"/>
           </a:solidFill>
           <a:ln>
             <a:noFill/>
@@ -4397,7 +4383,7 @@
         </p:nvSpPr>
         <p:spPr>
           <a:xfrm>
-            <a:off x="2799137" y="1451972"/>
+            <a:off x="2791346" y="1457436"/>
             <a:ext cx="123630" cy="493416"/>
           </a:xfrm>
           <a:prstGeom prst="rect">
@@ -4452,16 +4438,14 @@
         </p:nvSpPr>
         <p:spPr>
           <a:xfrm>
-            <a:off x="2941104" y="1650160"/>
-            <a:ext cx="79478" cy="90450"/>
+            <a:off x="2929178" y="1655014"/>
+            <a:ext cx="100800" cy="126000"/>
           </a:xfrm>
           <a:prstGeom prst="rightArrow">
             <a:avLst/>
           </a:prstGeom>
           <a:solidFill>
-            <a:schemeClr val="accent3">
-              <a:lumMod val="75000"/>
-            </a:schemeClr>
+            <a:srgbClr val="00B0F0"/>
           </a:solidFill>
           <a:ln>
             <a:noFill/>
@@ -4506,17 +4490,14 @@
         </p:nvSpPr>
         <p:spPr>
           <a:xfrm>
-            <a:off x="3031896" y="1451972"/>
+            <a:off x="3042394" y="1457692"/>
             <a:ext cx="123630" cy="493416"/>
           </a:xfrm>
           <a:prstGeom prst="rect">
             <a:avLst/>
           </a:prstGeom>
           <a:solidFill>
-            <a:schemeClr val="accent3">
-              <a:lumMod val="40000"/>
-              <a:lumOff val="60000"/>
-            </a:schemeClr>
+            <a:srgbClr val="C4E1F3"/>
           </a:solidFill>
           <a:ln>
             <a:noFill/>
@@ -4561,16 +4542,14 @@
         </p:nvSpPr>
         <p:spPr>
           <a:xfrm rot="5400000">
-            <a:off x="3060688" y="1968124"/>
-            <a:ext cx="79478" cy="90450"/>
+            <a:off x="3052042" y="1961010"/>
+            <a:ext cx="100800" cy="126000"/>
           </a:xfrm>
           <a:prstGeom prst="rightArrow">
             <a:avLst/>
           </a:prstGeom>
           <a:solidFill>
-            <a:schemeClr val="accent2">
-              <a:lumMod val="75000"/>
-            </a:schemeClr>
+            <a:srgbClr val="FF0000"/>
           </a:solidFill>
           <a:ln>
             <a:noFill/>
@@ -4615,16 +4594,14 @@
         </p:nvSpPr>
         <p:spPr>
           <a:xfrm rot="5400000">
-            <a:off x="3070562" y="2183568"/>
-            <a:ext cx="79478" cy="90450"/>
+            <a:off x="3061916" y="2176454"/>
+            <a:ext cx="100800" cy="126000"/>
           </a:xfrm>
           <a:prstGeom prst="rightArrow">
             <a:avLst/>
           </a:prstGeom>
           <a:solidFill>
-            <a:schemeClr val="accent2">
-              <a:lumMod val="75000"/>
-            </a:schemeClr>
+            <a:srgbClr val="FF0000"/>
           </a:solidFill>
           <a:ln>
             <a:noFill/>
@@ -4726,8 +4703,8 @@
             </p:nvSpPr>
             <p:spPr>
               <a:xfrm>
-                <a:off x="2227897" y="2239312"/>
-                <a:ext cx="845809" cy="321948"/>
+                <a:off x="2027870" y="2209770"/>
+                <a:ext cx="1010341" cy="379463"/>
               </a:xfrm>
               <a:prstGeom prst="rect">
                 <a:avLst/>
@@ -4740,6 +4717,7 @@
               </a:bodyPr>
               <a:lstStyle/>
               <a:p>
+                <a:pPr/>
                 <a14:m>
                   <m:oMathPara xmlns:m="http://schemas.openxmlformats.org/officeDocument/2006/math">
                     <m:oMathParaPr>
@@ -4749,14 +4727,14 @@
                       <m:f>
                         <m:fPr>
                           <m:ctrlPr>
-                            <a:rPr lang="en-GB" sz="800" i="1" smtClean="0">
+                            <a:rPr lang="en-GB" sz="1000" i="1" smtClean="0">
                               <a:latin typeface="Cambria Math" panose="02040503050406030204" pitchFamily="18" charset="0"/>
                             </a:rPr>
                           </m:ctrlPr>
                         </m:fPr>
                         <m:num>
                           <m:r>
-                            <a:rPr lang="en-GB" sz="800" b="0" i="1" smtClean="0">
+                            <a:rPr lang="en-GB" sz="1000" b="0" i="1" smtClean="0">
                               <a:latin typeface="Cambria Math" panose="02040503050406030204" pitchFamily="18" charset="0"/>
                             </a:rPr>
                             <m:t>𝑁</m:t>
@@ -4766,14 +4744,14 @@
                           <m:sSup>
                             <m:sSupPr>
                               <m:ctrlPr>
-                                <a:rPr lang="en-GB" sz="800" i="1" smtClean="0">
+                                <a:rPr lang="en-GB" sz="1000" i="1" smtClean="0">
                                   <a:latin typeface="Cambria Math" panose="02040503050406030204" pitchFamily="18" charset="0"/>
                                 </a:rPr>
                               </m:ctrlPr>
                             </m:sSupPr>
                             <m:e>
                               <m:r>
-                                <a:rPr lang="en-GB" sz="800" b="0" i="1" smtClean="0">
+                                <a:rPr lang="en-GB" sz="1000" b="0" i="1" smtClean="0">
                                   <a:latin typeface="Cambria Math" panose="02040503050406030204" pitchFamily="18" charset="0"/>
                                 </a:rPr>
                                 <m:t>2</m:t>
@@ -4781,7 +4759,7 @@
                             </m:e>
                             <m:sup>
                               <m:r>
-                                <a:rPr lang="en-GB" sz="800" b="0" i="1" smtClean="0">
+                                <a:rPr lang="en-GB" sz="1000" b="0" i="1" smtClean="0">
                                   <a:latin typeface="Cambria Math" panose="02040503050406030204" pitchFamily="18" charset="0"/>
                                 </a:rPr>
                                 <m:t>𝐿</m:t>
@@ -4791,7 +4769,7 @@
                         </m:den>
                       </m:f>
                       <m:r>
-                        <a:rPr lang="en-GB" sz="800" b="0" i="1" smtClean="0">
+                        <a:rPr lang="en-GB" sz="1000" b="0" i="1" smtClean="0">
                           <a:latin typeface="Cambria Math" panose="02040503050406030204" pitchFamily="18" charset="0"/>
                         </a:rPr>
                         <m:t> × (48 ×</m:t>
@@ -4799,14 +4777,14 @@
                       <m:sSup>
                         <m:sSupPr>
                           <m:ctrlPr>
-                            <a:rPr lang="en-GB" sz="800" b="0" i="1" smtClean="0">
+                            <a:rPr lang="en-GB" sz="1000" b="0" i="1" smtClean="0">
                               <a:latin typeface="Cambria Math" panose="02040503050406030204" pitchFamily="18" charset="0"/>
                             </a:rPr>
                           </m:ctrlPr>
                         </m:sSupPr>
                         <m:e>
                           <m:r>
-                            <a:rPr lang="en-GB" sz="800" b="0" i="1" smtClean="0">
+                            <a:rPr lang="en-GB" sz="1000" b="0" i="1" smtClean="0">
                               <a:latin typeface="Cambria Math" panose="02040503050406030204" pitchFamily="18" charset="0"/>
                             </a:rPr>
                             <m:t>2</m:t>
@@ -4814,7 +4792,7 @@
                         </m:e>
                         <m:sup>
                           <m:r>
-                            <a:rPr lang="en-GB" sz="800" b="0" i="1" smtClean="0">
+                            <a:rPr lang="en-GB" sz="1000" b="0" i="1" smtClean="0">
                               <a:latin typeface="Cambria Math" panose="02040503050406030204" pitchFamily="18" charset="0"/>
                             </a:rPr>
                             <m:t>𝐿</m:t>
@@ -4822,7 +4800,7 @@
                         </m:sup>
                       </m:sSup>
                       <m:r>
-                        <a:rPr lang="en-GB" sz="800" b="0" i="1" smtClean="0">
+                        <a:rPr lang="en-GB" sz="1000" b="0" i="1" smtClean="0">
                           <a:latin typeface="Cambria Math" panose="02040503050406030204" pitchFamily="18" charset="0"/>
                         </a:rPr>
                         <m:t>)</m:t>
@@ -4830,7 +4808,7 @@
                     </m:oMath>
                   </m:oMathPara>
                 </a14:m>
-                <a:endParaRPr lang="en-GB" sz="800" dirty="0"/>
+                <a:endParaRPr lang="en-GB" sz="1000" dirty="0"/>
               </a:p>
             </p:txBody>
           </p:sp>
@@ -4852,8 +4830,8 @@
             </p:nvSpPr>
             <p:spPr>
               <a:xfrm>
-                <a:off x="2227897" y="2239312"/>
-                <a:ext cx="845809" cy="321948"/>
+                <a:off x="2027870" y="2209770"/>
+                <a:ext cx="1010341" cy="379463"/>
               </a:xfrm>
               <a:prstGeom prst="rect">
                 <a:avLst/>
@@ -4894,16 +4872,14 @@
         </p:nvSpPr>
         <p:spPr>
           <a:xfrm>
-            <a:off x="3285017" y="2355806"/>
-            <a:ext cx="79478" cy="90450"/>
+            <a:off x="3262583" y="2355806"/>
+            <a:ext cx="100800" cy="126000"/>
           </a:xfrm>
           <a:prstGeom prst="rightArrow">
             <a:avLst/>
           </a:prstGeom>
           <a:solidFill>
-            <a:schemeClr val="accent3">
-              <a:lumMod val="75000"/>
-            </a:schemeClr>
+            <a:srgbClr val="00B0F0"/>
           </a:solidFill>
           <a:ln>
             <a:noFill/>
@@ -5004,15 +4980,13 @@
         <p:spPr>
           <a:xfrm>
             <a:off x="3651615" y="2355806"/>
-            <a:ext cx="79478" cy="90450"/>
+            <a:ext cx="100800" cy="126000"/>
           </a:xfrm>
           <a:prstGeom prst="rightArrow">
             <a:avLst/>
           </a:prstGeom>
           <a:solidFill>
-            <a:schemeClr val="accent3">
-              <a:lumMod val="75000"/>
-            </a:schemeClr>
+            <a:srgbClr val="00B0F0"/>
           </a:solidFill>
           <a:ln>
             <a:noFill/>
@@ -5112,16 +5086,14 @@
         </p:nvSpPr>
         <p:spPr>
           <a:xfrm rot="16200000">
-            <a:off x="3848261" y="2076784"/>
-            <a:ext cx="79478" cy="90450"/>
+            <a:off x="3837600" y="2048284"/>
+            <a:ext cx="100800" cy="126000"/>
           </a:xfrm>
           <a:prstGeom prst="rightArrow">
             <a:avLst/>
           </a:prstGeom>
           <a:solidFill>
-            <a:schemeClr val="accent4">
-              <a:lumMod val="75000"/>
-            </a:schemeClr>
+            <a:srgbClr val="00B050"/>
           </a:solidFill>
           <a:ln>
             <a:noFill/>
@@ -5222,7 +5194,7 @@
         <p:spPr>
           <a:xfrm>
             <a:off x="3221504" y="1650160"/>
-            <a:ext cx="509589" cy="90450"/>
+            <a:ext cx="509589" cy="126000"/>
           </a:xfrm>
           <a:prstGeom prst="rightArrow">
             <a:avLst/>
@@ -5331,16 +5303,14 @@
         </p:nvSpPr>
         <p:spPr>
           <a:xfrm>
-            <a:off x="4028652" y="1650160"/>
-            <a:ext cx="79478" cy="90450"/>
+            <a:off x="4015141" y="1650160"/>
+            <a:ext cx="100800" cy="126000"/>
           </a:xfrm>
           <a:prstGeom prst="rightArrow">
             <a:avLst/>
           </a:prstGeom>
           <a:solidFill>
-            <a:schemeClr val="accent3">
-              <a:lumMod val="75000"/>
-            </a:schemeClr>
+            <a:srgbClr val="00B0F0"/>
           </a:solidFill>
           <a:ln>
             <a:noFill/>
@@ -5440,16 +5410,14 @@
         </p:nvSpPr>
         <p:spPr>
           <a:xfrm>
-            <a:off x="4282422" y="1650160"/>
-            <a:ext cx="79478" cy="90450"/>
+            <a:off x="4261244" y="1650265"/>
+            <a:ext cx="100800" cy="126000"/>
           </a:xfrm>
           <a:prstGeom prst="rightArrow">
             <a:avLst/>
           </a:prstGeom>
           <a:solidFill>
-            <a:schemeClr val="accent3">
-              <a:lumMod val="75000"/>
-            </a:schemeClr>
+            <a:srgbClr val="00B0F0"/>
           </a:solidFill>
           <a:ln>
             <a:noFill/>
@@ -5494,7 +5462,7 @@
         </p:nvSpPr>
         <p:spPr>
           <a:xfrm>
-            <a:off x="4373214" y="1451972"/>
+            <a:off x="4373553" y="1454427"/>
             <a:ext cx="123630" cy="493416"/>
           </a:xfrm>
           <a:prstGeom prst="rect">
@@ -5549,16 +5517,14 @@
         </p:nvSpPr>
         <p:spPr>
           <a:xfrm rot="16200000">
-            <a:off x="4400186" y="1332656"/>
-            <a:ext cx="79478" cy="90450"/>
+            <a:off x="4387822" y="1309237"/>
+            <a:ext cx="100800" cy="126000"/>
           </a:xfrm>
           <a:prstGeom prst="rightArrow">
             <a:avLst/>
           </a:prstGeom>
           <a:solidFill>
-            <a:schemeClr val="accent4">
-              <a:lumMod val="75000"/>
-            </a:schemeClr>
+            <a:srgbClr val="00B050"/>
           </a:solidFill>
           <a:ln>
             <a:noFill/>
@@ -5603,7 +5569,7 @@
         </p:nvSpPr>
         <p:spPr>
           <a:xfrm>
-            <a:off x="4409161" y="181037"/>
+            <a:off x="4429442" y="175663"/>
             <a:ext cx="64886" cy="1122753"/>
           </a:xfrm>
           <a:prstGeom prst="rect">
@@ -5658,8 +5624,8 @@
         </p:nvSpPr>
         <p:spPr>
           <a:xfrm>
-            <a:off x="2696118" y="693311"/>
-            <a:ext cx="1597969" cy="90450"/>
+            <a:off x="2700969" y="678305"/>
+            <a:ext cx="1597969" cy="126000"/>
           </a:xfrm>
           <a:prstGeom prst="rightArrow">
             <a:avLst/>
@@ -5713,7 +5679,7 @@
         </p:nvSpPr>
         <p:spPr>
           <a:xfrm>
-            <a:off x="4354941" y="181037"/>
+            <a:off x="4375222" y="175663"/>
             <a:ext cx="59742" cy="1122753"/>
           </a:xfrm>
           <a:prstGeom prst="rect">
@@ -5768,16 +5734,14 @@
         </p:nvSpPr>
         <p:spPr>
           <a:xfrm>
-            <a:off x="4517807" y="696080"/>
-            <a:ext cx="79478" cy="90450"/>
+            <a:off x="4501222" y="678305"/>
+            <a:ext cx="100800" cy="126000"/>
           </a:xfrm>
           <a:prstGeom prst="rightArrow">
             <a:avLst/>
           </a:prstGeom>
           <a:solidFill>
-            <a:schemeClr val="accent3">
-              <a:lumMod val="75000"/>
-            </a:schemeClr>
+            <a:srgbClr val="00B0F0"/>
           </a:solidFill>
           <a:ln>
             <a:noFill/>
@@ -5877,16 +5841,14 @@
         </p:nvSpPr>
         <p:spPr>
           <a:xfrm>
-            <a:off x="4738231" y="693875"/>
-            <a:ext cx="79478" cy="90450"/>
+            <a:off x="4700864" y="678305"/>
+            <a:ext cx="100800" cy="126000"/>
           </a:xfrm>
           <a:prstGeom prst="rightArrow">
             <a:avLst/>
           </a:prstGeom>
           <a:solidFill>
-            <a:schemeClr val="accent3">
-              <a:lumMod val="75000"/>
-            </a:schemeClr>
+            <a:srgbClr val="00B0F0"/>
           </a:solidFill>
           <a:ln>
             <a:noFill/>
@@ -5986,16 +5948,14 @@
         </p:nvSpPr>
         <p:spPr>
           <a:xfrm>
-            <a:off x="4958724" y="693311"/>
-            <a:ext cx="176556" cy="90450"/>
+            <a:off x="4949907" y="678305"/>
+            <a:ext cx="176556" cy="126000"/>
           </a:xfrm>
           <a:prstGeom prst="rightArrow">
             <a:avLst/>
           </a:prstGeom>
           <a:solidFill>
-            <a:schemeClr val="accent3">
-              <a:lumMod val="75000"/>
-            </a:schemeClr>
+            <a:srgbClr val="00B0F0"/>
           </a:solidFill>
           <a:ln>
             <a:noFill/>
@@ -6040,7 +6000,7 @@
         </p:nvSpPr>
         <p:spPr>
           <a:xfrm>
-            <a:off x="5174881" y="172680"/>
+            <a:off x="5154216" y="172679"/>
             <a:ext cx="133001" cy="1122753"/>
           </a:xfrm>
           <a:prstGeom prst="rect">
@@ -6048,8 +6008,8 @@
           </a:prstGeom>
           <a:solidFill>
             <a:schemeClr val="accent4">
-              <a:lumMod val="40000"/>
-              <a:lumOff val="60000"/>
+              <a:lumMod val="60000"/>
+              <a:lumOff val="40000"/>
             </a:schemeClr>
           </a:solidFill>
           <a:ln>
@@ -6096,7 +6056,7 @@
         <p:spPr>
           <a:xfrm>
             <a:off x="4920517" y="1252669"/>
-            <a:ext cx="652743" cy="215444"/>
+            <a:ext cx="766557" cy="246221"/>
           </a:xfrm>
           <a:prstGeom prst="rect">
             <a:avLst/>
@@ -6110,7 +6070,7 @@
           <a:lstStyle/>
           <a:p>
             <a:r>
-              <a:rPr lang="en-GB" sz="800" dirty="0"/>
+              <a:rPr lang="en-GB" sz="1000" dirty="0"/>
               <a:t>Predictions</a:t>
             </a:r>
           </a:p>
@@ -6132,8 +6092,8 @@
             </p:nvSpPr>
             <p:spPr>
               <a:xfrm>
-                <a:off x="4992651" y="0"/>
-                <a:ext cx="508473" cy="215444"/>
+                <a:off x="4958724" y="-15991"/>
+                <a:ext cx="590226" cy="246221"/>
               </a:xfrm>
               <a:prstGeom prst="rect">
                 <a:avLst/>
@@ -6146,6 +6106,7 @@
               </a:bodyPr>
               <a:lstStyle/>
               <a:p>
+                <a:pPr/>
                 <a14:m>
                   <m:oMathPara xmlns:m="http://schemas.openxmlformats.org/officeDocument/2006/math">
                     <m:oMathParaPr>
@@ -6156,19 +6117,19 @@
                         <m:rPr>
                           <m:sty m:val="p"/>
                         </m:rPr>
-                        <a:rPr lang="en-GB" sz="800" b="0" i="0" smtClean="0">
+                        <a:rPr lang="en-GB" sz="1000" b="0" i="0" smtClean="0">
                           <a:latin typeface="Cambria Math" panose="02040503050406030204" pitchFamily="18" charset="0"/>
                         </a:rPr>
                         <m:t>N</m:t>
                       </m:r>
                       <m:r>
-                        <a:rPr lang="en-GB" sz="800" b="0" i="0" smtClean="0">
+                        <a:rPr lang="en-GB" sz="1000" b="0" i="0" smtClean="0">
                           <a:latin typeface="Cambria Math" panose="02040503050406030204" pitchFamily="18" charset="0"/>
                         </a:rPr>
                         <m:t> </m:t>
                       </m:r>
                       <m:r>
-                        <a:rPr lang="en-GB" sz="800" b="0" i="1" smtClean="0">
+                        <a:rPr lang="en-GB" sz="1000" b="0" i="1" smtClean="0">
                           <a:latin typeface="Cambria Math" panose="02040503050406030204" pitchFamily="18" charset="0"/>
                         </a:rPr>
                         <m:t>× 20</m:t>
@@ -6176,7 +6137,7 @@
                     </m:oMath>
                   </m:oMathPara>
                 </a14:m>
-                <a:endParaRPr lang="en-GB" sz="800" dirty="0"/>
+                <a:endParaRPr lang="en-GB" sz="1000" dirty="0"/>
               </a:p>
             </p:txBody>
           </p:sp>
@@ -6198,8 +6159,8 @@
             </p:nvSpPr>
             <p:spPr>
               <a:xfrm>
-                <a:off x="4992651" y="0"/>
-                <a:ext cx="508473" cy="215444"/>
+                <a:off x="4958724" y="-15991"/>
+                <a:ext cx="590226" cy="246221"/>
               </a:xfrm>
               <a:prstGeom prst="rect">
                 <a:avLst/>
@@ -6207,7 +6168,7 @@
               <a:blipFill>
                 <a:blip r:embed="rId7"/>
                 <a:stretch>
-                  <a:fillRect b="-5882"/>
+                  <a:fillRect/>
                 </a:stretch>
               </a:blipFill>
             </p:spPr>
@@ -6240,8 +6201,8 @@
         </p:nvSpPr>
         <p:spPr>
           <a:xfrm>
-            <a:off x="5292207" y="569934"/>
-            <a:ext cx="1261884" cy="338554"/>
+            <a:off x="5220716" y="534000"/>
+            <a:ext cx="1338828" cy="400110"/>
           </a:xfrm>
           <a:prstGeom prst="rect">
             <a:avLst/>
@@ -6255,18 +6216,18 @@
           <a:lstStyle/>
           <a:p>
             <a:r>
-              <a:rPr lang="en-GB" sz="800" dirty="0"/>
+              <a:rPr lang="en-GB" sz="1000" dirty="0"/>
               <a:t>Sigmoid: Classification</a:t>
             </a:r>
           </a:p>
           <a:p>
             <a:r>
-              <a:rPr lang="en-GB" sz="800" dirty="0" err="1"/>
+              <a:rPr lang="en-GB" sz="1000" dirty="0" err="1"/>
               <a:t>Softmax</a:t>
             </a:r>
             <a:r>
-              <a:rPr lang="en-GB" sz="800" dirty="0"/>
-              <a:t>: PSSM Prediction</a:t>
+              <a:rPr lang="en-GB" sz="1000" dirty="0"/>
+              <a:t>: PSSM</a:t>
             </a:r>
           </a:p>
         </p:txBody>

</xml_diff>

<commit_message>
Updated schematic to include hyperparams
</commit_message>
<xml_diff>
--- a/figures/model_schematic.pptx
+++ b/figures/model_schematic.pptx
@@ -254,7 +254,7 @@
           <a:p>
             <a:fld id="{38358F19-04FC-804D-A08D-923B11D07663}" type="datetimeFigureOut">
               <a:rPr lang="en-GB" smtClean="0"/>
-              <a:t>27/09/2021</a:t>
+              <a:t>19/11/2021</a:t>
             </a:fld>
             <a:endParaRPr lang="en-GB"/>
           </a:p>
@@ -424,7 +424,7 @@
           <a:p>
             <a:fld id="{38358F19-04FC-804D-A08D-923B11D07663}" type="datetimeFigureOut">
               <a:rPr lang="en-GB" smtClean="0"/>
-              <a:t>27/09/2021</a:t>
+              <a:t>19/11/2021</a:t>
             </a:fld>
             <a:endParaRPr lang="en-GB"/>
           </a:p>
@@ -604,7 +604,7 @@
           <a:p>
             <a:fld id="{38358F19-04FC-804D-A08D-923B11D07663}" type="datetimeFigureOut">
               <a:rPr lang="en-GB" smtClean="0"/>
-              <a:t>27/09/2021</a:t>
+              <a:t>19/11/2021</a:t>
             </a:fld>
             <a:endParaRPr lang="en-GB"/>
           </a:p>
@@ -774,7 +774,7 @@
           <a:p>
             <a:fld id="{38358F19-04FC-804D-A08D-923B11D07663}" type="datetimeFigureOut">
               <a:rPr lang="en-GB" smtClean="0"/>
-              <a:t>27/09/2021</a:t>
+              <a:t>19/11/2021</a:t>
             </a:fld>
             <a:endParaRPr lang="en-GB"/>
           </a:p>
@@ -1020,7 +1020,7 @@
           <a:p>
             <a:fld id="{38358F19-04FC-804D-A08D-923B11D07663}" type="datetimeFigureOut">
               <a:rPr lang="en-GB" smtClean="0"/>
-              <a:t>27/09/2021</a:t>
+              <a:t>19/11/2021</a:t>
             </a:fld>
             <a:endParaRPr lang="en-GB"/>
           </a:p>
@@ -1252,7 +1252,7 @@
           <a:p>
             <a:fld id="{38358F19-04FC-804D-A08D-923B11D07663}" type="datetimeFigureOut">
               <a:rPr lang="en-GB" smtClean="0"/>
-              <a:t>27/09/2021</a:t>
+              <a:t>19/11/2021</a:t>
             </a:fld>
             <a:endParaRPr lang="en-GB"/>
           </a:p>
@@ -1619,7 +1619,7 @@
           <a:p>
             <a:fld id="{38358F19-04FC-804D-A08D-923B11D07663}" type="datetimeFigureOut">
               <a:rPr lang="en-GB" smtClean="0"/>
-              <a:t>27/09/2021</a:t>
+              <a:t>19/11/2021</a:t>
             </a:fld>
             <a:endParaRPr lang="en-GB"/>
           </a:p>
@@ -1737,7 +1737,7 @@
           <a:p>
             <a:fld id="{38358F19-04FC-804D-A08D-923B11D07663}" type="datetimeFigureOut">
               <a:rPr lang="en-GB" smtClean="0"/>
-              <a:t>27/09/2021</a:t>
+              <a:t>19/11/2021</a:t>
             </a:fld>
             <a:endParaRPr lang="en-GB"/>
           </a:p>
@@ -1832,7 +1832,7 @@
           <a:p>
             <a:fld id="{38358F19-04FC-804D-A08D-923B11D07663}" type="datetimeFigureOut">
               <a:rPr lang="en-GB" smtClean="0"/>
-              <a:t>27/09/2021</a:t>
+              <a:t>19/11/2021</a:t>
             </a:fld>
             <a:endParaRPr lang="en-GB"/>
           </a:p>
@@ -2109,7 +2109,7 @@
           <a:p>
             <a:fld id="{38358F19-04FC-804D-A08D-923B11D07663}" type="datetimeFigureOut">
               <a:rPr lang="en-GB" smtClean="0"/>
-              <a:t>27/09/2021</a:t>
+              <a:t>19/11/2021</a:t>
             </a:fld>
             <a:endParaRPr lang="en-GB"/>
           </a:p>
@@ -2366,7 +2366,7 @@
           <a:p>
             <a:fld id="{38358F19-04FC-804D-A08D-923B11D07663}" type="datetimeFigureOut">
               <a:rPr lang="en-GB" smtClean="0"/>
-              <a:t>27/09/2021</a:t>
+              <a:t>19/11/2021</a:t>
             </a:fld>
             <a:endParaRPr lang="en-GB"/>
           </a:p>
@@ -2579,7 +2579,7 @@
           <a:p>
             <a:fld id="{38358F19-04FC-804D-A08D-923B11D07663}" type="datetimeFigureOut">
               <a:rPr lang="en-GB" smtClean="0"/>
-              <a:t>27/09/2021</a:t>
+              <a:t>19/11/2021</a:t>
             </a:fld>
             <a:endParaRPr lang="en-GB"/>
           </a:p>
@@ -4050,8 +4050,8 @@
           </a:p>
         </p:txBody>
       </p:sp>
-      <mc:AlternateContent xmlns:mc="http://schemas.openxmlformats.org/markup-compatibility/2006" xmlns:a14="http://schemas.microsoft.com/office/drawing/2010/main">
-        <mc:Choice Requires="a14">
+      <mc:AlternateContent xmlns:mc="http://schemas.openxmlformats.org/markup-compatibility/2006">
+        <mc:Choice xmlns:a14="http://schemas.microsoft.com/office/drawing/2010/main" Requires="a14">
           <p:sp>
             <p:nvSpPr>
               <p:cNvPr id="45" name="TextBox 44">
@@ -4067,7 +4067,7 @@
             <p:spPr>
               <a:xfrm>
                 <a:off x="1965558" y="1555745"/>
-                <a:ext cx="622735" cy="379463"/>
+                <a:ext cx="565219" cy="379463"/>
               </a:xfrm>
               <a:prstGeom prst="rect">
                 <a:avLst/>
@@ -4116,7 +4116,13 @@
                         <a:rPr lang="en-GB" sz="1000" b="0" i="1" smtClean="0">
                           <a:latin typeface="Cambria Math" panose="02040503050406030204" pitchFamily="18" charset="0"/>
                         </a:rPr>
-                        <m:t> × 48</m:t>
+                        <m:t> × </m:t>
+                      </m:r>
+                      <m:r>
+                        <a:rPr lang="en-GB" sz="1000" b="0" i="1" smtClean="0">
+                          <a:latin typeface="Cambria Math" panose="02040503050406030204" pitchFamily="18" charset="0"/>
+                        </a:rPr>
+                        <m:t>𝐹</m:t>
                       </m:r>
                     </m:oMath>
                   </m:oMathPara>
@@ -4126,7 +4132,7 @@
             </p:txBody>
           </p:sp>
         </mc:Choice>
-        <mc:Fallback xmlns="">
+        <mc:Fallback>
           <p:sp>
             <p:nvSpPr>
               <p:cNvPr id="45" name="TextBox 44">
@@ -4144,7 +4150,7 @@
             <p:spPr>
               <a:xfrm>
                 <a:off x="1965558" y="1555745"/>
-                <a:ext cx="622735" cy="379463"/>
+                <a:ext cx="565219" cy="379463"/>
               </a:xfrm>
               <a:prstGeom prst="rect">
                 <a:avLst/>
@@ -4687,8 +4693,8 @@
           </a:p>
         </p:txBody>
       </p:sp>
-      <mc:AlternateContent xmlns:mc="http://schemas.openxmlformats.org/markup-compatibility/2006" xmlns:a14="http://schemas.microsoft.com/office/drawing/2010/main">
-        <mc:Choice Requires="a14">
+      <mc:AlternateContent xmlns:mc="http://schemas.openxmlformats.org/markup-compatibility/2006">
+        <mc:Choice xmlns:a14="http://schemas.microsoft.com/office/drawing/2010/main" Requires="a14">
           <p:sp>
             <p:nvSpPr>
               <p:cNvPr id="56" name="TextBox 55">
@@ -4704,7 +4710,7 @@
             <p:spPr>
               <a:xfrm>
                 <a:off x="2027870" y="2209770"/>
-                <a:ext cx="1010341" cy="379463"/>
+                <a:ext cx="832600" cy="379463"/>
               </a:xfrm>
               <a:prstGeom prst="rect">
                 <a:avLst/>
@@ -4772,7 +4778,7 @@
                         <a:rPr lang="en-GB" sz="1000" b="0" i="1" smtClean="0">
                           <a:latin typeface="Cambria Math" panose="02040503050406030204" pitchFamily="18" charset="0"/>
                         </a:rPr>
-                        <m:t> × (48 ×</m:t>
+                        <m:t> × (</m:t>
                       </m:r>
                       <m:sSup>
                         <m:sSupPr>
@@ -4803,6 +4809,12 @@
                         <a:rPr lang="en-GB" sz="1000" b="0" i="1" smtClean="0">
                           <a:latin typeface="Cambria Math" panose="02040503050406030204" pitchFamily="18" charset="0"/>
                         </a:rPr>
+                        <m:t>𝐹</m:t>
+                      </m:r>
+                      <m:r>
+                        <a:rPr lang="en-GB" sz="1000" b="0" i="1" smtClean="0">
+                          <a:latin typeface="Cambria Math" panose="02040503050406030204" pitchFamily="18" charset="0"/>
+                        </a:rPr>
                         <m:t>)</m:t>
                       </m:r>
                     </m:oMath>
@@ -4813,7 +4825,7 @@
             </p:txBody>
           </p:sp>
         </mc:Choice>
-        <mc:Fallback xmlns="">
+        <mc:Fallback>
           <p:sp>
             <p:nvSpPr>
               <p:cNvPr id="56" name="TextBox 55">
@@ -4831,7 +4843,7 @@
             <p:spPr>
               <a:xfrm>
                 <a:off x="2027870" y="2209770"/>
-                <a:ext cx="1010341" cy="379463"/>
+                <a:ext cx="832600" cy="379463"/>
               </a:xfrm>
               <a:prstGeom prst="rect">
                 <a:avLst/>
@@ -6232,6 +6244,166 @@
           </a:p>
         </p:txBody>
       </p:sp>
+      <mc:AlternateContent xmlns:mc="http://schemas.openxmlformats.org/markup-compatibility/2006">
+        <mc:Choice xmlns:a14="http://schemas.microsoft.com/office/drawing/2010/main" Requires="a14">
+          <p:sp>
+            <p:nvSpPr>
+              <p:cNvPr id="2" name="TextBox 1">
+                <a:extLst>
+                  <a:ext uri="{FF2B5EF4-FFF2-40B4-BE49-F238E27FC236}">
+                    <a16:creationId xmlns:a16="http://schemas.microsoft.com/office/drawing/2014/main" id="{555F37D1-8ADD-4B49-8E50-78F6469B3110}"/>
+                  </a:ext>
+                </a:extLst>
+              </p:cNvPr>
+              <p:cNvSpPr txBox="1"/>
+              <p:nvPr/>
+            </p:nvSpPr>
+            <p:spPr>
+              <a:xfrm>
+                <a:off x="4894953" y="2197073"/>
+                <a:ext cx="1555563" cy="707886"/>
+              </a:xfrm>
+              <a:prstGeom prst="rect">
+                <a:avLst/>
+              </a:prstGeom>
+              <a:noFill/>
+            </p:spPr>
+            <p:txBody>
+              <a:bodyPr wrap="square" rtlCol="0">
+                <a:spAutoFit/>
+              </a:bodyPr>
+              <a:lstStyle/>
+              <a:p>
+                <a:pPr algn="r"/>
+                <a:r>
+                  <a:rPr lang="en-GB" sz="1000" b="1" dirty="0"/>
+                  <a:t>Hyperparameters</a:t>
+                </a:r>
+              </a:p>
+              <a:p>
+                <a:pPr algn="r"/>
+                <a:r>
+                  <a:rPr lang="en-GB" sz="1000" b="0" dirty="0"/>
+                  <a:t>Base filters: </a:t>
+                </a:r>
+                <a14:m>
+                  <m:oMath xmlns:m="http://schemas.openxmlformats.org/officeDocument/2006/math">
+                    <m:r>
+                      <a:rPr lang="en-GB" sz="1000" b="0" i="1" smtClean="0">
+                        <a:latin typeface="Cambria Math" panose="02040503050406030204" pitchFamily="18" charset="0"/>
+                      </a:rPr>
+                      <m:t>𝐹</m:t>
+                    </m:r>
+                    <m:r>
+                      <a:rPr lang="en-GB" sz="1000" b="0" i="1" smtClean="0">
+                        <a:latin typeface="Cambria Math" panose="02040503050406030204" pitchFamily="18" charset="0"/>
+                      </a:rPr>
+                      <m:t>=64</m:t>
+                    </m:r>
+                  </m:oMath>
+                </a14:m>
+                <a:endParaRPr lang="en-GB" sz="1000" b="0" i="1" dirty="0">
+                  <a:latin typeface="Cambria Math" panose="02040503050406030204" pitchFamily="18" charset="0"/>
+                </a:endParaRPr>
+              </a:p>
+              <a:p>
+                <a:pPr algn="r"/>
+                <a:r>
+                  <a:rPr lang="en-GB" sz="1000" b="0" dirty="0"/>
+                  <a:t>UNET Layers: </a:t>
+                </a:r>
+                <a14:m>
+                  <m:oMath xmlns:m="http://schemas.openxmlformats.org/officeDocument/2006/math">
+                    <m:r>
+                      <a:rPr lang="en-GB" sz="1000" b="0" i="1" smtClean="0">
+                        <a:latin typeface="Cambria Math" panose="02040503050406030204" pitchFamily="18" charset="0"/>
+                      </a:rPr>
+                      <m:t>𝐿</m:t>
+                    </m:r>
+                    <m:r>
+                      <a:rPr lang="en-GB" sz="1000" b="0" i="1" smtClean="0">
+                        <a:latin typeface="Cambria Math" panose="02040503050406030204" pitchFamily="18" charset="0"/>
+                      </a:rPr>
+                      <m:t>=6</m:t>
+                    </m:r>
+                  </m:oMath>
+                </a14:m>
+                <a:endParaRPr lang="en-GB" sz="1000" b="0" i="1" dirty="0">
+                  <a:latin typeface="Cambria Math" panose="02040503050406030204" pitchFamily="18" charset="0"/>
+                </a:endParaRPr>
+              </a:p>
+              <a:p>
+                <a:pPr algn="r"/>
+                <a:r>
+                  <a:rPr lang="en-GB" sz="1000" b="0" dirty="0"/>
+                  <a:t>CNN kernel width </a:t>
+                </a:r>
+                <a14:m>
+                  <m:oMath xmlns:m="http://schemas.openxmlformats.org/officeDocument/2006/math">
+                    <m:r>
+                      <a:rPr lang="en-GB" sz="1000" b="0" i="1" smtClean="0">
+                        <a:latin typeface="Cambria Math" panose="02040503050406030204" pitchFamily="18" charset="0"/>
+                      </a:rPr>
+                      <m:t>𝐾</m:t>
+                    </m:r>
+                    <m:r>
+                      <a:rPr lang="en-GB" sz="1000" b="0" i="1" smtClean="0">
+                        <a:latin typeface="Cambria Math" panose="02040503050406030204" pitchFamily="18" charset="0"/>
+                      </a:rPr>
+                      <m:t>=9</m:t>
+                    </m:r>
+                  </m:oMath>
+                </a14:m>
+                <a:endParaRPr lang="en-GB" sz="1000" dirty="0"/>
+              </a:p>
+            </p:txBody>
+          </p:sp>
+        </mc:Choice>
+        <mc:Fallback>
+          <p:sp>
+            <p:nvSpPr>
+              <p:cNvPr id="2" name="TextBox 1">
+                <a:extLst>
+                  <a:ext uri="{FF2B5EF4-FFF2-40B4-BE49-F238E27FC236}">
+                    <a16:creationId xmlns:a16="http://schemas.microsoft.com/office/drawing/2014/main" id="{555F37D1-8ADD-4B49-8E50-78F6469B3110}"/>
+                  </a:ext>
+                </a:extLst>
+              </p:cNvPr>
+              <p:cNvSpPr txBox="1">
+                <a:spLocks noRot="1" noChangeAspect="1" noMove="1" noResize="1" noEditPoints="1" noAdjustHandles="1" noChangeArrowheads="1" noChangeShapeType="1" noTextEdit="1"/>
+              </p:cNvSpPr>
+              <p:nvPr/>
+            </p:nvSpPr>
+            <p:spPr>
+              <a:xfrm>
+                <a:off x="4894953" y="2197073"/>
+                <a:ext cx="1555563" cy="707886"/>
+              </a:xfrm>
+              <a:prstGeom prst="rect">
+                <a:avLst/>
+              </a:prstGeom>
+              <a:blipFill>
+                <a:blip r:embed="rId8"/>
+                <a:stretch>
+                  <a:fillRect b="-3509"/>
+                </a:stretch>
+              </a:blipFill>
+            </p:spPr>
+            <p:txBody>
+              <a:bodyPr/>
+              <a:lstStyle/>
+              <a:p>
+                <a:r>
+                  <a:rPr lang="en-GB">
+                    <a:noFill/>
+                  </a:rPr>
+                  <a:t> </a:t>
+                </a:r>
+              </a:p>
+            </p:txBody>
+          </p:sp>
+        </mc:Fallback>
+      </mc:AlternateContent>
     </p:spTree>
     <p:extLst>
       <p:ext uri="{BB962C8B-B14F-4D97-AF65-F5344CB8AC3E}">

</xml_diff>